<commit_message>
Update presentations, padj, donor bias for abundance differences
</commit_message>
<xml_diff>
--- a/linsley_postdoc/presentations/weekly_meetings/1_10_24.pptx
+++ b/linsley_postdoc/presentations/weekly_meetings/1_10_24.pptx
@@ -8348,6 +8348,64 @@
           </a:prstGeom>
         </p:spPr>
       </p:pic>
+      <p:sp>
+        <p:nvSpPr>
+          <p:cNvPr id="4" name="TextBox 3">
+            <a:extLst>
+              <a:ext uri="{FF2B5EF4-FFF2-40B4-BE49-F238E27FC236}">
+                <a16:creationId xmlns:a16="http://schemas.microsoft.com/office/drawing/2014/main" id="{C8809062-065E-81FF-82A5-C0CC8AE32B6E}"/>
+              </a:ext>
+            </a:extLst>
+          </p:cNvPr>
+          <p:cNvSpPr txBox="1"/>
+          <p:nvPr/>
+        </p:nvSpPr>
+        <p:spPr>
+          <a:xfrm>
+            <a:off x="3439489" y="4554621"/>
+            <a:ext cx="3122137" cy="1169551"/>
+          </a:xfrm>
+          <a:prstGeom prst="rect">
+            <a:avLst/>
+          </a:prstGeom>
+          <a:noFill/>
+        </p:spPr>
+        <p:txBody>
+          <a:bodyPr wrap="none" rtlCol="0">
+            <a:spAutoFit/>
+          </a:bodyPr>
+          <a:lstStyle/>
+          <a:p>
+            <a:r>
+              <a:rPr lang="en-US" sz="2000" dirty="0">
+                <a:effectLst/>
+              </a:rPr>
+              <a:t>CD4 TEM TRB CDR3 length</a:t>
+            </a:r>
+          </a:p>
+          <a:p>
+            <a:pPr lvl="1"/>
+            <a:r>
+              <a:rPr lang="en-US" sz="1600" dirty="0">
+                <a:effectLst/>
+              </a:rPr>
+              <a:t>Colitis down: 10-40%, 70-80%</a:t>
+            </a:r>
+          </a:p>
+          <a:p>
+            <a:pPr lvl="1"/>
+            <a:r>
+              <a:rPr lang="en-US" sz="1600" dirty="0">
+                <a:effectLst/>
+              </a:rPr>
+              <a:t>Colitis norm: 30, 70%</a:t>
+            </a:r>
+          </a:p>
+          <a:p>
+            <a:endParaRPr lang="en-US" dirty="0"/>
+          </a:p>
+        </p:txBody>
+      </p:sp>
     </p:spTree>
     <p:extLst>
       <p:ext uri="{BB962C8B-B14F-4D97-AF65-F5344CB8AC3E}">

</xml_diff>